<commit_message>
End of day 3
</commit_message>
<xml_diff>
--- a/slides/Introduction to Julia.pptx
+++ b/slides/Introduction to Julia.pptx
@@ -247,7 +247,7 @@
           <a:p>
             <a:fld id="{93A4496A-9D10-4F9B-876E-D9FE17FAE8BB}" type="datetimeFigureOut">
               <a:rPr lang="en-US" smtClean="0"/>
-              <a:t>8/15/17</a:t>
+              <a:t>8/16/17</a:t>
             </a:fld>
             <a:endParaRPr lang="en-US"/>
           </a:p>
@@ -417,7 +417,7 @@
           <a:p>
             <a:fld id="{93A4496A-9D10-4F9B-876E-D9FE17FAE8BB}" type="datetimeFigureOut">
               <a:rPr lang="en-US" smtClean="0"/>
-              <a:t>8/15/17</a:t>
+              <a:t>8/16/17</a:t>
             </a:fld>
             <a:endParaRPr lang="en-US"/>
           </a:p>
@@ -597,7 +597,7 @@
           <a:p>
             <a:fld id="{93A4496A-9D10-4F9B-876E-D9FE17FAE8BB}" type="datetimeFigureOut">
               <a:rPr lang="en-US" smtClean="0"/>
-              <a:t>8/15/17</a:t>
+              <a:t>8/16/17</a:t>
             </a:fld>
             <a:endParaRPr lang="en-US"/>
           </a:p>
@@ -767,7 +767,7 @@
           <a:p>
             <a:fld id="{93A4496A-9D10-4F9B-876E-D9FE17FAE8BB}" type="datetimeFigureOut">
               <a:rPr lang="en-US" smtClean="0"/>
-              <a:t>8/15/17</a:t>
+              <a:t>8/16/17</a:t>
             </a:fld>
             <a:endParaRPr lang="en-US"/>
           </a:p>
@@ -1013,7 +1013,7 @@
           <a:p>
             <a:fld id="{93A4496A-9D10-4F9B-876E-D9FE17FAE8BB}" type="datetimeFigureOut">
               <a:rPr lang="en-US" smtClean="0"/>
-              <a:t>8/15/17</a:t>
+              <a:t>8/16/17</a:t>
             </a:fld>
             <a:endParaRPr lang="en-US"/>
           </a:p>
@@ -1245,7 +1245,7 @@
           <a:p>
             <a:fld id="{93A4496A-9D10-4F9B-876E-D9FE17FAE8BB}" type="datetimeFigureOut">
               <a:rPr lang="en-US" smtClean="0"/>
-              <a:t>8/15/17</a:t>
+              <a:t>8/16/17</a:t>
             </a:fld>
             <a:endParaRPr lang="en-US"/>
           </a:p>
@@ -1612,7 +1612,7 @@
           <a:p>
             <a:fld id="{93A4496A-9D10-4F9B-876E-D9FE17FAE8BB}" type="datetimeFigureOut">
               <a:rPr lang="en-US" smtClean="0"/>
-              <a:t>8/15/17</a:t>
+              <a:t>8/16/17</a:t>
             </a:fld>
             <a:endParaRPr lang="en-US"/>
           </a:p>
@@ -1730,7 +1730,7 @@
           <a:p>
             <a:fld id="{93A4496A-9D10-4F9B-876E-D9FE17FAE8BB}" type="datetimeFigureOut">
               <a:rPr lang="en-US" smtClean="0"/>
-              <a:t>8/15/17</a:t>
+              <a:t>8/16/17</a:t>
             </a:fld>
             <a:endParaRPr lang="en-US"/>
           </a:p>
@@ -1825,7 +1825,7 @@
           <a:p>
             <a:fld id="{93A4496A-9D10-4F9B-876E-D9FE17FAE8BB}" type="datetimeFigureOut">
               <a:rPr lang="en-US" smtClean="0"/>
-              <a:t>8/15/17</a:t>
+              <a:t>8/16/17</a:t>
             </a:fld>
             <a:endParaRPr lang="en-US"/>
           </a:p>
@@ -2102,7 +2102,7 @@
           <a:p>
             <a:fld id="{93A4496A-9D10-4F9B-876E-D9FE17FAE8BB}" type="datetimeFigureOut">
               <a:rPr lang="en-US" smtClean="0"/>
-              <a:t>8/15/17</a:t>
+              <a:t>8/16/17</a:t>
             </a:fld>
             <a:endParaRPr lang="en-US"/>
           </a:p>
@@ -2355,7 +2355,7 @@
           <a:p>
             <a:fld id="{93A4496A-9D10-4F9B-876E-D9FE17FAE8BB}" type="datetimeFigureOut">
               <a:rPr lang="en-US" smtClean="0"/>
-              <a:t>8/15/17</a:t>
+              <a:t>8/16/17</a:t>
             </a:fld>
             <a:endParaRPr lang="en-US"/>
           </a:p>
@@ -2568,7 +2568,7 @@
           <a:p>
             <a:fld id="{93A4496A-9D10-4F9B-876E-D9FE17FAE8BB}" type="datetimeFigureOut">
               <a:rPr lang="en-US" smtClean="0"/>
-              <a:t>8/15/17</a:t>
+              <a:t>8/16/17</a:t>
             </a:fld>
             <a:endParaRPr lang="en-US"/>
           </a:p>
@@ -3087,11 +3087,7 @@
           <a:p>
             <a:r>
               <a:rPr lang="en-US" dirty="0" smtClean="0"/>
-              <a:t>Julia is </a:t>
-            </a:r>
-            <a:r>
-              <a:rPr lang="en-US" dirty="0" smtClean="0"/>
-              <a:t>fast</a:t>
+              <a:t>Julia is fast</a:t>
             </a:r>
           </a:p>
           <a:p>
@@ -3108,7 +3104,6 @@
               <a:rPr lang="en-US" dirty="0" smtClean="0"/>
               <a:t>.”</a:t>
             </a:r>
-            <a:endParaRPr lang="en-US" dirty="0" smtClean="0"/>
           </a:p>
           <a:p>
             <a:pPr lvl="1"/>
@@ -5954,7 +5949,7 @@
         <p:spPr/>
         <p:txBody>
           <a:bodyPr>
-            <a:normAutofit lnSpcReduction="10000"/>
+            <a:normAutofit/>
           </a:bodyPr>
           <a:lstStyle/>
           <a:p>
@@ -6057,65 +6052,49 @@
           </a:p>
           <a:p>
             <a:pPr lvl="1"/>
+            <a:endParaRPr lang="en-US" dirty="0" smtClean="0"/>
+          </a:p>
+          <a:p>
+            <a:r>
+              <a:rPr lang="en-US" dirty="0" smtClean="0"/>
+              <a:t>To run Julia in ECCO, type</a:t>
+            </a:r>
+          </a:p>
+          <a:p>
+            <a:pPr lvl="1"/>
+            <a:r>
+              <a:rPr lang="en-US" dirty="0"/>
+              <a:t>/</a:t>
+            </a:r>
+            <a:r>
+              <a:rPr lang="en-US" dirty="0" err="1" smtClean="0"/>
+              <a:t>cac</a:t>
+            </a:r>
+            <a:r>
+              <a:rPr lang="en-US" dirty="0" smtClean="0"/>
+              <a:t>/</a:t>
+            </a:r>
+            <a:r>
+              <a:rPr lang="en-US" dirty="0" err="1" smtClean="0"/>
+              <a:t>contrib</a:t>
+            </a:r>
+            <a:r>
+              <a:rPr lang="en-US" dirty="0" smtClean="0"/>
+              <a:t>/</a:t>
+            </a:r>
             <a:r>
               <a:rPr lang="en-US" dirty="0" err="1" smtClean="0"/>
               <a:t>julia</a:t>
             </a:r>
             <a:r>
               <a:rPr lang="en-US" dirty="0" smtClean="0"/>
-              <a:t> /Users/</a:t>
-            </a:r>
-            <a:r>
-              <a:rPr lang="en-US" dirty="0" err="1" smtClean="0"/>
-              <a:t>jinsoohan</a:t>
-            </a:r>
-            <a:r>
-              <a:rPr lang="en-US" dirty="0" smtClean="0"/>
-              <a:t>/Dropbox/</a:t>
-            </a:r>
-            <a:r>
-              <a:rPr lang="en-US" dirty="0" err="1" smtClean="0"/>
-              <a:t>CompEcon_class</a:t>
-            </a:r>
-            <a:r>
-              <a:rPr lang="en-US" dirty="0" smtClean="0"/>
-              <a:t>/</a:t>
+              <a:t>/julia-0.6.0/bin/</a:t>
             </a:r>
             <a:r>
               <a:rPr lang="en-US" dirty="0" err="1" smtClean="0"/>
               <a:t>julia</a:t>
             </a:r>
-            <a:r>
-              <a:rPr lang="en-US" dirty="0" smtClean="0"/>
-              <a:t>/</a:t>
-            </a:r>
-            <a:r>
-              <a:rPr lang="en-US" dirty="0" err="1" smtClean="0"/>
-              <a:t>julia_intro.jl</a:t>
-            </a:r>
-            <a:endParaRPr lang="en-US" dirty="0" smtClean="0"/>
-          </a:p>
-          <a:p>
-            <a:pPr lvl="1"/>
-            <a:endParaRPr lang="en-US" dirty="0" smtClean="0"/>
-          </a:p>
-          <a:p>
-            <a:r>
-              <a:rPr lang="en-US" dirty="0" smtClean="0"/>
-              <a:t>To run Julia in ECCO, type</a:t>
-            </a:r>
-          </a:p>
-          <a:p>
-            <a:pPr lvl="1"/>
-            <a:r>
-              <a:rPr lang="en-US" dirty="0" smtClean="0"/>
-              <a:t>/opt/julia-0.6.0/bin/</a:t>
-            </a:r>
-            <a:r>
-              <a:rPr lang="en-US" dirty="0" err="1" smtClean="0"/>
-              <a:t>julia</a:t>
-            </a:r>
-            <a:endParaRPr lang="en-US" dirty="0" smtClean="0"/>
+            <a:endParaRPr lang="en-US" dirty="0"/>
           </a:p>
           <a:p>
             <a:pPr lvl="1"/>
@@ -6208,7 +6187,23 @@
           <a:p>
             <a:r>
               <a:rPr lang="en-US" dirty="0"/>
-              <a:t>Personally, I use Atom + Julia for real-time compiling. </a:t>
+              <a:t>Personally, I use </a:t>
+            </a:r>
+            <a:r>
+              <a:rPr lang="en-US" dirty="0" smtClean="0"/>
+              <a:t>Juno (Atom </a:t>
+            </a:r>
+            <a:r>
+              <a:rPr lang="en-US" dirty="0"/>
+              <a:t>+ </a:t>
+            </a:r>
+            <a:r>
+              <a:rPr lang="en-US" dirty="0" smtClean="0"/>
+              <a:t>Julia) </a:t>
+            </a:r>
+            <a:r>
+              <a:rPr lang="en-US" dirty="0"/>
+              <a:t>for real-time compiling. </a:t>
             </a:r>
           </a:p>
           <a:p>

</xml_diff>

<commit_message>
update for IO mini lecture
</commit_message>
<xml_diff>
--- a/slides/Introduction to Julia.pptx
+++ b/slides/Introduction to Julia.pptx
@@ -7,9 +7,8 @@
   <p:sldIdLst>
     <p:sldId id="256" r:id="rId2"/>
     <p:sldId id="257" r:id="rId3"/>
-    <p:sldId id="258" r:id="rId4"/>
-    <p:sldId id="259" r:id="rId5"/>
-    <p:sldId id="260" r:id="rId6"/>
+    <p:sldId id="259" r:id="rId4"/>
+    <p:sldId id="258" r:id="rId5"/>
   </p:sldIdLst>
   <p:sldSz cx="12192000" cy="6858000"/>
   <p:notesSz cx="6858000" cy="9144000"/>
@@ -247,7 +246,7 @@
           <a:p>
             <a:fld id="{93A4496A-9D10-4F9B-876E-D9FE17FAE8BB}" type="datetimeFigureOut">
               <a:rPr lang="en-US" smtClean="0"/>
-              <a:t>8/16/17</a:t>
+              <a:t>8/23/2017</a:t>
             </a:fld>
             <a:endParaRPr lang="en-US"/>
           </a:p>
@@ -417,7 +416,7 @@
           <a:p>
             <a:fld id="{93A4496A-9D10-4F9B-876E-D9FE17FAE8BB}" type="datetimeFigureOut">
               <a:rPr lang="en-US" smtClean="0"/>
-              <a:t>8/16/17</a:t>
+              <a:t>8/23/2017</a:t>
             </a:fld>
             <a:endParaRPr lang="en-US"/>
           </a:p>
@@ -597,7 +596,7 @@
           <a:p>
             <a:fld id="{93A4496A-9D10-4F9B-876E-D9FE17FAE8BB}" type="datetimeFigureOut">
               <a:rPr lang="en-US" smtClean="0"/>
-              <a:t>8/16/17</a:t>
+              <a:t>8/23/2017</a:t>
             </a:fld>
             <a:endParaRPr lang="en-US"/>
           </a:p>
@@ -767,7 +766,7 @@
           <a:p>
             <a:fld id="{93A4496A-9D10-4F9B-876E-D9FE17FAE8BB}" type="datetimeFigureOut">
               <a:rPr lang="en-US" smtClean="0"/>
-              <a:t>8/16/17</a:t>
+              <a:t>8/23/2017</a:t>
             </a:fld>
             <a:endParaRPr lang="en-US"/>
           </a:p>
@@ -1013,7 +1012,7 @@
           <a:p>
             <a:fld id="{93A4496A-9D10-4F9B-876E-D9FE17FAE8BB}" type="datetimeFigureOut">
               <a:rPr lang="en-US" smtClean="0"/>
-              <a:t>8/16/17</a:t>
+              <a:t>8/23/2017</a:t>
             </a:fld>
             <a:endParaRPr lang="en-US"/>
           </a:p>
@@ -1245,7 +1244,7 @@
           <a:p>
             <a:fld id="{93A4496A-9D10-4F9B-876E-D9FE17FAE8BB}" type="datetimeFigureOut">
               <a:rPr lang="en-US" smtClean="0"/>
-              <a:t>8/16/17</a:t>
+              <a:t>8/23/2017</a:t>
             </a:fld>
             <a:endParaRPr lang="en-US"/>
           </a:p>
@@ -1612,7 +1611,7 @@
           <a:p>
             <a:fld id="{93A4496A-9D10-4F9B-876E-D9FE17FAE8BB}" type="datetimeFigureOut">
               <a:rPr lang="en-US" smtClean="0"/>
-              <a:t>8/16/17</a:t>
+              <a:t>8/23/2017</a:t>
             </a:fld>
             <a:endParaRPr lang="en-US"/>
           </a:p>
@@ -1730,7 +1729,7 @@
           <a:p>
             <a:fld id="{93A4496A-9D10-4F9B-876E-D9FE17FAE8BB}" type="datetimeFigureOut">
               <a:rPr lang="en-US" smtClean="0"/>
-              <a:t>8/16/17</a:t>
+              <a:t>8/23/2017</a:t>
             </a:fld>
             <a:endParaRPr lang="en-US"/>
           </a:p>
@@ -1825,7 +1824,7 @@
           <a:p>
             <a:fld id="{93A4496A-9D10-4F9B-876E-D9FE17FAE8BB}" type="datetimeFigureOut">
               <a:rPr lang="en-US" smtClean="0"/>
-              <a:t>8/16/17</a:t>
+              <a:t>8/23/2017</a:t>
             </a:fld>
             <a:endParaRPr lang="en-US"/>
           </a:p>
@@ -2102,7 +2101,7 @@
           <a:p>
             <a:fld id="{93A4496A-9D10-4F9B-876E-D9FE17FAE8BB}" type="datetimeFigureOut">
               <a:rPr lang="en-US" smtClean="0"/>
-              <a:t>8/16/17</a:t>
+              <a:t>8/23/2017</a:t>
             </a:fld>
             <a:endParaRPr lang="en-US"/>
           </a:p>
@@ -2355,7 +2354,7 @@
           <a:p>
             <a:fld id="{93A4496A-9D10-4F9B-876E-D9FE17FAE8BB}" type="datetimeFigureOut">
               <a:rPr lang="en-US" smtClean="0"/>
-              <a:t>8/16/17</a:t>
+              <a:t>8/23/2017</a:t>
             </a:fld>
             <a:endParaRPr lang="en-US"/>
           </a:p>
@@ -2568,7 +2567,7 @@
           <a:p>
             <a:fld id="{93A4496A-9D10-4F9B-876E-D9FE17FAE8BB}" type="datetimeFigureOut">
               <a:rPr lang="en-US" smtClean="0"/>
-              <a:t>8/16/17</a:t>
+              <a:t>8/23/2017</a:t>
             </a:fld>
             <a:endParaRPr lang="en-US"/>
           </a:p>
@@ -3193,18 +3192,90 @@
                 <a:tableStyleId>{5C22544A-7EE6-4342-B048-85BDC9FD1C3A}</a:tableStyleId>
               </a:tblPr>
               <a:tblGrid>
-                <a:gridCol w="896297"/>
-                <a:gridCol w="896297"/>
-                <a:gridCol w="834646"/>
-                <a:gridCol w="953203"/>
-                <a:gridCol w="1081246"/>
-                <a:gridCol w="1100215"/>
-                <a:gridCol w="1214030"/>
-                <a:gridCol w="1062276"/>
-                <a:gridCol w="948461"/>
-                <a:gridCol w="834646"/>
-                <a:gridCol w="839388"/>
-                <a:gridCol w="896297"/>
+                <a:gridCol w="896297">
+                  <a:extLst>
+                    <a:ext uri="{9D8B030D-6E8A-4147-A177-3AD203B41FA5}">
+                      <a16:colId xmlns:a16="http://schemas.microsoft.com/office/drawing/2014/main" val="20000"/>
+                    </a:ext>
+                  </a:extLst>
+                </a:gridCol>
+                <a:gridCol w="896297">
+                  <a:extLst>
+                    <a:ext uri="{9D8B030D-6E8A-4147-A177-3AD203B41FA5}">
+                      <a16:colId xmlns:a16="http://schemas.microsoft.com/office/drawing/2014/main" val="20001"/>
+                    </a:ext>
+                  </a:extLst>
+                </a:gridCol>
+                <a:gridCol w="834646">
+                  <a:extLst>
+                    <a:ext uri="{9D8B030D-6E8A-4147-A177-3AD203B41FA5}">
+                      <a16:colId xmlns:a16="http://schemas.microsoft.com/office/drawing/2014/main" val="20002"/>
+                    </a:ext>
+                  </a:extLst>
+                </a:gridCol>
+                <a:gridCol w="953203">
+                  <a:extLst>
+                    <a:ext uri="{9D8B030D-6E8A-4147-A177-3AD203B41FA5}">
+                      <a16:colId xmlns:a16="http://schemas.microsoft.com/office/drawing/2014/main" val="20003"/>
+                    </a:ext>
+                  </a:extLst>
+                </a:gridCol>
+                <a:gridCol w="1081246">
+                  <a:extLst>
+                    <a:ext uri="{9D8B030D-6E8A-4147-A177-3AD203B41FA5}">
+                      <a16:colId xmlns:a16="http://schemas.microsoft.com/office/drawing/2014/main" val="20004"/>
+                    </a:ext>
+                  </a:extLst>
+                </a:gridCol>
+                <a:gridCol w="1100215">
+                  <a:extLst>
+                    <a:ext uri="{9D8B030D-6E8A-4147-A177-3AD203B41FA5}">
+                      <a16:colId xmlns:a16="http://schemas.microsoft.com/office/drawing/2014/main" val="20005"/>
+                    </a:ext>
+                  </a:extLst>
+                </a:gridCol>
+                <a:gridCol w="1214030">
+                  <a:extLst>
+                    <a:ext uri="{9D8B030D-6E8A-4147-A177-3AD203B41FA5}">
+                      <a16:colId xmlns:a16="http://schemas.microsoft.com/office/drawing/2014/main" val="20006"/>
+                    </a:ext>
+                  </a:extLst>
+                </a:gridCol>
+                <a:gridCol w="1062276">
+                  <a:extLst>
+                    <a:ext uri="{9D8B030D-6E8A-4147-A177-3AD203B41FA5}">
+                      <a16:colId xmlns:a16="http://schemas.microsoft.com/office/drawing/2014/main" val="20007"/>
+                    </a:ext>
+                  </a:extLst>
+                </a:gridCol>
+                <a:gridCol w="948461">
+                  <a:extLst>
+                    <a:ext uri="{9D8B030D-6E8A-4147-A177-3AD203B41FA5}">
+                      <a16:colId xmlns:a16="http://schemas.microsoft.com/office/drawing/2014/main" val="20008"/>
+                    </a:ext>
+                  </a:extLst>
+                </a:gridCol>
+                <a:gridCol w="834646">
+                  <a:extLst>
+                    <a:ext uri="{9D8B030D-6E8A-4147-A177-3AD203B41FA5}">
+                      <a16:colId xmlns:a16="http://schemas.microsoft.com/office/drawing/2014/main" val="20009"/>
+                    </a:ext>
+                  </a:extLst>
+                </a:gridCol>
+                <a:gridCol w="839388">
+                  <a:extLst>
+                    <a:ext uri="{9D8B030D-6E8A-4147-A177-3AD203B41FA5}">
+                      <a16:colId xmlns:a16="http://schemas.microsoft.com/office/drawing/2014/main" val="20010"/>
+                    </a:ext>
+                  </a:extLst>
+                </a:gridCol>
+                <a:gridCol w="896297">
+                  <a:extLst>
+                    <a:ext uri="{9D8B030D-6E8A-4147-A177-3AD203B41FA5}">
+                      <a16:colId xmlns:a16="http://schemas.microsoft.com/office/drawing/2014/main" val="20011"/>
+                    </a:ext>
+                  </a:extLst>
+                </a:gridCol>
               </a:tblGrid>
               <a:tr h="153488">
                 <a:tc>
@@ -3492,6 +3563,11 @@
                   </a:txBody>
                   <a:tcPr marL="9525" marR="9525" marT="9525" marB="0" anchor="ctr"/>
                 </a:tc>
+                <a:extLst>
+                  <a:ext uri="{0D108BD9-81ED-4DB2-BD59-A6C34878D82A}">
+                    <a16:rowId xmlns:a16="http://schemas.microsoft.com/office/drawing/2014/main" val="10000"/>
+                  </a:ext>
+                </a:extLst>
               </a:tr>
               <a:tr h="299378">
                 <a:tc>
@@ -3779,6 +3855,11 @@
                   </a:txBody>
                   <a:tcPr marL="9525" marR="9525" marT="9525" marB="0" anchor="ctr"/>
                 </a:tc>
+                <a:extLst>
+                  <a:ext uri="{0D108BD9-81ED-4DB2-BD59-A6C34878D82A}">
+                    <a16:rowId xmlns:a16="http://schemas.microsoft.com/office/drawing/2014/main" val="10001"/>
+                  </a:ext>
+                </a:extLst>
               </a:tr>
               <a:tr h="153488">
                 <a:tc>
@@ -4060,6 +4141,11 @@
                   </a:txBody>
                   <a:tcPr marL="9525" marR="171450" marT="9525" marB="0" anchor="ctr"/>
                 </a:tc>
+                <a:extLst>
+                  <a:ext uri="{0D108BD9-81ED-4DB2-BD59-A6C34878D82A}">
+                    <a16:rowId xmlns:a16="http://schemas.microsoft.com/office/drawing/2014/main" val="10002"/>
+                  </a:ext>
+                </a:extLst>
               </a:tr>
               <a:tr h="153488">
                 <a:tc>
@@ -4341,6 +4427,11 @@
                   </a:txBody>
                   <a:tcPr marL="9525" marR="171450" marT="9525" marB="0" anchor="ctr"/>
                 </a:tc>
+                <a:extLst>
+                  <a:ext uri="{0D108BD9-81ED-4DB2-BD59-A6C34878D82A}">
+                    <a16:rowId xmlns:a16="http://schemas.microsoft.com/office/drawing/2014/main" val="10003"/>
+                  </a:ext>
+                </a:extLst>
               </a:tr>
               <a:tr h="153488">
                 <a:tc>
@@ -4622,6 +4713,11 @@
                   </a:txBody>
                   <a:tcPr marL="9525" marR="171450" marT="9525" marB="0" anchor="ctr"/>
                 </a:tc>
+                <a:extLst>
+                  <a:ext uri="{0D108BD9-81ED-4DB2-BD59-A6C34878D82A}">
+                    <a16:rowId xmlns:a16="http://schemas.microsoft.com/office/drawing/2014/main" val="10004"/>
+                  </a:ext>
+                </a:extLst>
               </a:tr>
               <a:tr h="153488">
                 <a:tc>
@@ -4903,6 +4999,11 @@
                   </a:txBody>
                   <a:tcPr marL="9525" marR="171450" marT="9525" marB="0" anchor="ctr"/>
                 </a:tc>
+                <a:extLst>
+                  <a:ext uri="{0D108BD9-81ED-4DB2-BD59-A6C34878D82A}">
+                    <a16:rowId xmlns:a16="http://schemas.microsoft.com/office/drawing/2014/main" val="10005"/>
+                  </a:ext>
+                </a:extLst>
               </a:tr>
               <a:tr h="153488">
                 <a:tc>
@@ -5184,6 +5285,11 @@
                   </a:txBody>
                   <a:tcPr marL="9525" marR="171450" marT="9525" marB="0" anchor="ctr"/>
                 </a:tc>
+                <a:extLst>
+                  <a:ext uri="{0D108BD9-81ED-4DB2-BD59-A6C34878D82A}">
+                    <a16:rowId xmlns:a16="http://schemas.microsoft.com/office/drawing/2014/main" val="10006"/>
+                  </a:ext>
+                </a:extLst>
               </a:tr>
               <a:tr h="299378">
                 <a:tc>
@@ -5465,6 +5571,11 @@
                   </a:txBody>
                   <a:tcPr marL="9525" marR="171450" marT="9525" marB="0" anchor="ctr"/>
                 </a:tc>
+                <a:extLst>
+                  <a:ext uri="{0D108BD9-81ED-4DB2-BD59-A6C34878D82A}">
+                    <a16:rowId xmlns:a16="http://schemas.microsoft.com/office/drawing/2014/main" val="10007"/>
+                  </a:ext>
+                </a:extLst>
               </a:tr>
               <a:tr h="299378">
                 <a:tc>
@@ -5746,6 +5857,11 @@
                   </a:txBody>
                   <a:tcPr marL="9525" marR="171450" marT="9525" marB="0" anchor="ctr"/>
                 </a:tc>
+                <a:extLst>
+                  <a:ext uri="{0D108BD9-81ED-4DB2-BD59-A6C34878D82A}">
+                    <a16:rowId xmlns:a16="http://schemas.microsoft.com/office/drawing/2014/main" val="10008"/>
+                  </a:ext>
+                </a:extLst>
               </a:tr>
             </a:tbl>
           </a:graphicData>
@@ -5798,7 +5914,7 @@
           <a:p>
             <a:r>
               <a:rPr lang="en-US" dirty="0" smtClean="0"/>
-              <a:t>References</a:t>
+              <a:t>Installation</a:t>
             </a:r>
             <a:endParaRPr lang="en-US" dirty="0"/>
           </a:p>
@@ -5823,14 +5939,18 @@
           <a:p>
             <a:r>
               <a:rPr lang="en-US" dirty="0" smtClean="0"/>
-              <a:t>Tutorials </a:t>
+              <a:t>Julia only</a:t>
             </a:r>
           </a:p>
           <a:p>
             <a:pPr lvl="1"/>
             <a:r>
               <a:rPr lang="en-US" dirty="0" smtClean="0"/>
-              <a:t>https://julialang.org/learning/</a:t>
+              <a:t>Follow the instructions in https</a:t>
+            </a:r>
+            <a:r>
+              <a:rPr lang="en-US" dirty="0"/>
+              <a:t>://julialang.org/downloads/</a:t>
             </a:r>
           </a:p>
           <a:p>
@@ -5839,43 +5959,61 @@
           <a:p>
             <a:r>
               <a:rPr lang="en-US" dirty="0" smtClean="0"/>
-              <a:t>Documentation </a:t>
+              <a:t>Juno (Julia + Atom)</a:t>
             </a:r>
           </a:p>
           <a:p>
             <a:pPr lvl="1"/>
             <a:r>
               <a:rPr lang="en-US" dirty="0" smtClean="0"/>
-              <a:t>https://docs.julialang.org/en/stable/index.html</a:t>
+              <a:t>Recommended setup for the first time users</a:t>
             </a:r>
           </a:p>
           <a:p>
             <a:pPr lvl="1"/>
             <a:r>
+              <a:rPr lang="en-US" dirty="0" smtClean="0"/>
+              <a:t>Juno is a powerful integrated </a:t>
+            </a:r>
+            <a:r>
               <a:rPr lang="en-US" dirty="0"/>
-              <a:t>https://</a:t>
-            </a:r>
-            <a:r>
-              <a:rPr lang="en-US" dirty="0" err="1"/>
-              <a:t>en.wikibooks.org</a:t>
+              <a:t>development </a:t>
+            </a:r>
+            <a:r>
+              <a:rPr lang="en-US" dirty="0" smtClean="0"/>
+              <a:t>environment for programming in Julia</a:t>
+            </a:r>
+          </a:p>
+          <a:p>
+            <a:pPr lvl="1"/>
+            <a:r>
+              <a:rPr lang="en-US" dirty="0" smtClean="0"/>
+              <a:t>Follow the </a:t>
             </a:r>
             <a:r>
               <a:rPr lang="en-US" dirty="0"/>
-              <a:t>/wiki/</a:t>
-            </a:r>
-            <a:r>
-              <a:rPr lang="en-US" dirty="0" err="1"/>
-              <a:t>Introducing_Julia</a:t>
+              <a:t>instructions </a:t>
+            </a:r>
+            <a:r>
+              <a:rPr lang="en-US" dirty="0" smtClean="0"/>
+              <a:t>in </a:t>
             </a:r>
             <a:r>
               <a:rPr lang="en-US" dirty="0"/>
-              <a:t>/</a:t>
-            </a:r>
-            <a:r>
-              <a:rPr lang="en-US" dirty="0" err="1"/>
-              <a:t>Getting_started</a:t>
+              <a:t>https://github.com/JunoLab/uber-juno/blob/master/setup.md</a:t>
             </a:r>
             <a:endParaRPr lang="en-US" dirty="0" smtClean="0"/>
+          </a:p>
+          <a:p>
+            <a:pPr lvl="1"/>
+            <a:endParaRPr lang="en-US" dirty="0" smtClean="0"/>
+          </a:p>
+          <a:p>
+            <a:pPr lvl="1"/>
+            <a:endParaRPr lang="en-US" dirty="0" smtClean="0"/>
+          </a:p>
+          <a:p>
+            <a:endParaRPr lang="en-US" dirty="0"/>
           </a:p>
           <a:p>
             <a:pPr lvl="1"/>
@@ -5886,7 +6024,7 @@
     </p:spTree>
     <p:extLst>
       <p:ext uri="{BB962C8B-B14F-4D97-AF65-F5344CB8AC3E}">
-        <p14:creationId xmlns:p14="http://schemas.microsoft.com/office/powerpoint/2010/main" val="689675124"/>
+        <p14:creationId xmlns:p14="http://schemas.microsoft.com/office/powerpoint/2010/main" val="1296696042"/>
       </p:ext>
     </p:extLst>
   </p:cSld>
@@ -5930,7 +6068,7 @@
           <a:p>
             <a:r>
               <a:rPr lang="en-US" dirty="0" smtClean="0"/>
-              <a:t>Getting started</a:t>
+              <a:t>Other References</a:t>
             </a:r>
             <a:endParaRPr lang="en-US" dirty="0"/>
           </a:p>
@@ -5954,8 +6092,33 @@
           <a:lstStyle/>
           <a:p>
             <a:r>
+              <a:rPr lang="en-US" smtClean="0"/>
+              <a:t>Basic tutorials </a:t>
+            </a:r>
+            <a:endParaRPr lang="en-US" dirty="0" smtClean="0"/>
+          </a:p>
+          <a:p>
+            <a:pPr lvl="1"/>
+            <a:r>
               <a:rPr lang="en-US" dirty="0" smtClean="0"/>
-              <a:t>Download &amp; Install</a:t>
+              <a:t>https://julialang.org/learning/</a:t>
+            </a:r>
+          </a:p>
+          <a:p>
+            <a:endParaRPr lang="en-US" dirty="0" smtClean="0"/>
+          </a:p>
+          <a:p>
+            <a:r>
+              <a:rPr lang="en-US" dirty="0" smtClean="0"/>
+              <a:t>Documentation </a:t>
+            </a:r>
+            <a:endParaRPr lang="en-US" dirty="0" smtClean="0"/>
+          </a:p>
+          <a:p>
+            <a:pPr lvl="1"/>
+            <a:r>
+              <a:rPr lang="en-US" dirty="0" smtClean="0"/>
+              <a:t>https://docs.julialang.org/en/stable/index.html</a:t>
             </a:r>
           </a:p>
           <a:p>
@@ -5966,150 +6129,25 @@
             </a:r>
             <a:r>
               <a:rPr lang="en-US" dirty="0" err="1"/>
-              <a:t>julialang.org</a:t>
+              <a:t>en.wikibooks.org</a:t>
             </a:r>
             <a:r>
               <a:rPr lang="en-US" dirty="0"/>
-              <a:t>/downloads/</a:t>
-            </a:r>
-          </a:p>
-          <a:p>
-            <a:endParaRPr lang="en-US" dirty="0"/>
-          </a:p>
-          <a:p>
-            <a:r>
-              <a:rPr lang="en-US" dirty="0" smtClean="0"/>
-              <a:t>To run Julia in local terminal, type</a:t>
-            </a:r>
-          </a:p>
-          <a:p>
-            <a:pPr lvl="1"/>
+              <a:t>/wiki/</a:t>
+            </a:r>
+            <a:r>
+              <a:rPr lang="en-US" dirty="0" err="1"/>
+              <a:t>Introducing_Julia</a:t>
+            </a:r>
             <a:r>
               <a:rPr lang="en-US" dirty="0"/>
               <a:t>/</a:t>
             </a:r>
             <a:r>
-              <a:rPr lang="en-US" dirty="0" smtClean="0"/>
-              <a:t>Applications/Julia-0.6.app/Contents/Resources/</a:t>
-            </a:r>
-            <a:r>
-              <a:rPr lang="en-US" dirty="0" err="1" smtClean="0"/>
-              <a:t>julia</a:t>
-            </a:r>
-            <a:r>
-              <a:rPr lang="en-US" dirty="0" smtClean="0"/>
-              <a:t>/bin/</a:t>
-            </a:r>
-            <a:r>
-              <a:rPr lang="en-US" dirty="0" err="1" smtClean="0"/>
-              <a:t>julia</a:t>
+              <a:rPr lang="en-US" dirty="0" err="1"/>
+              <a:t>Getting_started</a:t>
             </a:r>
             <a:endParaRPr lang="en-US" dirty="0" smtClean="0"/>
-          </a:p>
-          <a:p>
-            <a:pPr lvl="1"/>
-            <a:r>
-              <a:rPr lang="en-US" dirty="0"/>
-              <a:t>OR set a </a:t>
-            </a:r>
-            <a:r>
-              <a:rPr lang="en-US" dirty="0" smtClean="0"/>
-              <a:t>path: </a:t>
-            </a:r>
-            <a:r>
-              <a:rPr lang="en-US" dirty="0"/>
-              <a:t>ln -fs "/Applications/Julia-0.6.app/Contents/Resources/</a:t>
-            </a:r>
-            <a:r>
-              <a:rPr lang="en-US" dirty="0" err="1"/>
-              <a:t>julia</a:t>
-            </a:r>
-            <a:r>
-              <a:rPr lang="en-US" dirty="0"/>
-              <a:t>/bin/</a:t>
-            </a:r>
-            <a:r>
-              <a:rPr lang="en-US" dirty="0" err="1"/>
-              <a:t>julia</a:t>
-            </a:r>
-            <a:r>
-              <a:rPr lang="en-US" dirty="0"/>
-              <a:t>" /</a:t>
-            </a:r>
-            <a:r>
-              <a:rPr lang="en-US" dirty="0" err="1" smtClean="0"/>
-              <a:t>usr</a:t>
-            </a:r>
-            <a:r>
-              <a:rPr lang="en-US" dirty="0" smtClean="0"/>
-              <a:t>/local/bin/</a:t>
-            </a:r>
-            <a:r>
-              <a:rPr lang="en-US" dirty="0" err="1" smtClean="0"/>
-              <a:t>julia</a:t>
-            </a:r>
-            <a:endParaRPr lang="en-US" dirty="0" smtClean="0"/>
-          </a:p>
-          <a:p>
-            <a:pPr lvl="1"/>
-            <a:endParaRPr lang="en-US" dirty="0" smtClean="0"/>
-          </a:p>
-          <a:p>
-            <a:r>
-              <a:rPr lang="en-US" dirty="0" smtClean="0"/>
-              <a:t>To run Julia in ECCO, type</a:t>
-            </a:r>
-          </a:p>
-          <a:p>
-            <a:pPr lvl="1"/>
-            <a:r>
-              <a:rPr lang="en-US" dirty="0"/>
-              <a:t>/</a:t>
-            </a:r>
-            <a:r>
-              <a:rPr lang="en-US" dirty="0" err="1" smtClean="0"/>
-              <a:t>cac</a:t>
-            </a:r>
-            <a:r>
-              <a:rPr lang="en-US" dirty="0" smtClean="0"/>
-              <a:t>/</a:t>
-            </a:r>
-            <a:r>
-              <a:rPr lang="en-US" dirty="0" err="1" smtClean="0"/>
-              <a:t>contrib</a:t>
-            </a:r>
-            <a:r>
-              <a:rPr lang="en-US" dirty="0" smtClean="0"/>
-              <a:t>/</a:t>
-            </a:r>
-            <a:r>
-              <a:rPr lang="en-US" dirty="0" err="1" smtClean="0"/>
-              <a:t>julia</a:t>
-            </a:r>
-            <a:r>
-              <a:rPr lang="en-US" dirty="0" smtClean="0"/>
-              <a:t>/julia-0.6.0/bin/</a:t>
-            </a:r>
-            <a:r>
-              <a:rPr lang="en-US" dirty="0" err="1" smtClean="0"/>
-              <a:t>julia</a:t>
-            </a:r>
-            <a:endParaRPr lang="en-US" dirty="0"/>
-          </a:p>
-          <a:p>
-            <a:pPr lvl="1"/>
-            <a:endParaRPr lang="en-US" dirty="0" smtClean="0"/>
-          </a:p>
-          <a:p>
-            <a:pPr lvl="1"/>
-            <a:endParaRPr lang="en-US" dirty="0" smtClean="0"/>
-          </a:p>
-          <a:p>
-            <a:pPr lvl="1"/>
-            <a:endParaRPr lang="en-US" dirty="0" smtClean="0"/>
-          </a:p>
-          <a:p>
-            <a:endParaRPr lang="en-US" dirty="0"/>
           </a:p>
           <a:p>
             <a:pPr lvl="1"/>
@@ -6120,115 +6158,7 @@
     </p:spTree>
     <p:extLst>
       <p:ext uri="{BB962C8B-B14F-4D97-AF65-F5344CB8AC3E}">
-        <p14:creationId xmlns:p14="http://schemas.microsoft.com/office/powerpoint/2010/main" val="1296696042"/>
-      </p:ext>
-    </p:extLst>
-  </p:cSld>
-  <p:clrMapOvr>
-    <a:masterClrMapping/>
-  </p:clrMapOvr>
-</p:sld>
-</file>
-
-<file path=ppt/slides/slide5.xml><?xml version="1.0" encoding="utf-8"?>
-<p:sld xmlns:a="http://schemas.openxmlformats.org/drawingml/2006/main" xmlns:r="http://schemas.openxmlformats.org/officeDocument/2006/relationships" xmlns:p="http://schemas.openxmlformats.org/presentationml/2006/main">
-  <p:cSld>
-    <p:spTree>
-      <p:nvGrpSpPr>
-        <p:cNvPr id="1" name=""/>
-        <p:cNvGrpSpPr/>
-        <p:nvPr/>
-      </p:nvGrpSpPr>
-      <p:grpSpPr>
-        <a:xfrm>
-          <a:off x="0" y="0"/>
-          <a:ext cx="0" cy="0"/>
-          <a:chOff x="0" y="0"/>
-          <a:chExt cx="0" cy="0"/>
-        </a:xfrm>
-      </p:grpSpPr>
-      <p:sp>
-        <p:nvSpPr>
-          <p:cNvPr id="2" name="Title 1"/>
-          <p:cNvSpPr>
-            <a:spLocks noGrp="1"/>
-          </p:cNvSpPr>
-          <p:nvPr>
-            <p:ph type="title"/>
-          </p:nvPr>
-        </p:nvSpPr>
-        <p:spPr/>
-        <p:txBody>
-          <a:bodyPr/>
-          <a:lstStyle/>
-          <a:p>
-            <a:r>
-              <a:rPr lang="en-US" dirty="0" smtClean="0"/>
-              <a:t>Getting started</a:t>
-            </a:r>
-            <a:endParaRPr lang="en-US" dirty="0"/>
-          </a:p>
-        </p:txBody>
-      </p:sp>
-      <p:sp>
-        <p:nvSpPr>
-          <p:cNvPr id="3" name="Content Placeholder 2"/>
-          <p:cNvSpPr>
-            <a:spLocks noGrp="1"/>
-          </p:cNvSpPr>
-          <p:nvPr>
-            <p:ph idx="1"/>
-          </p:nvPr>
-        </p:nvSpPr>
-        <p:spPr/>
-        <p:txBody>
-          <a:bodyPr/>
-          <a:lstStyle/>
-          <a:p>
-            <a:r>
-              <a:rPr lang="en-US" dirty="0"/>
-              <a:t>Personally, I use </a:t>
-            </a:r>
-            <a:r>
-              <a:rPr lang="en-US" dirty="0" smtClean="0"/>
-              <a:t>Juno (Atom </a:t>
-            </a:r>
-            <a:r>
-              <a:rPr lang="en-US" dirty="0"/>
-              <a:t>+ </a:t>
-            </a:r>
-            <a:r>
-              <a:rPr lang="en-US" dirty="0" smtClean="0"/>
-              <a:t>Julia) </a:t>
-            </a:r>
-            <a:r>
-              <a:rPr lang="en-US" dirty="0"/>
-              <a:t>for real-time compiling. </a:t>
-            </a:r>
-          </a:p>
-          <a:p>
-            <a:pPr lvl="1"/>
-            <a:r>
-              <a:rPr lang="en-US" dirty="0"/>
-              <a:t>Pros: easy debugging</a:t>
-            </a:r>
-          </a:p>
-          <a:p>
-            <a:pPr lvl="1"/>
-            <a:r>
-              <a:rPr lang="en-US" dirty="0"/>
-              <a:t>Cons: can be slow.. So write code in Atom and run in terminal or on grid</a:t>
-            </a:r>
-          </a:p>
-          <a:p>
-            <a:endParaRPr lang="en-US" dirty="0"/>
-          </a:p>
-        </p:txBody>
-      </p:sp>
-    </p:spTree>
-    <p:extLst>
-      <p:ext uri="{BB962C8B-B14F-4D97-AF65-F5344CB8AC3E}">
-        <p14:creationId xmlns:p14="http://schemas.microsoft.com/office/powerpoint/2010/main" val="1147507434"/>
+        <p14:creationId xmlns:p14="http://schemas.microsoft.com/office/powerpoint/2010/main" val="689675124"/>
       </p:ext>
     </p:extLst>
   </p:cSld>

</xml_diff>